<commit_message>
documentation files added for eproject
</commit_message>
<xml_diff>
--- a/XML.pptx
+++ b/XML.pptx
@@ -187,6 +187,105 @@
 <file path=ppt/changesInfos/changesInfo1.xml><?xml version="1.0" encoding="utf-8"?>
 <pc:chgInfo xmlns:a="http://schemas.openxmlformats.org/drawingml/2006/main" xmlns:r="http://schemas.openxmlformats.org/officeDocument/2006/relationships" xmlns:ac="http://schemas.microsoft.com/office/drawing/2013/main/command" xmlns:pc="http://schemas.microsoft.com/office/powerpoint/2013/main/command">
   <pc:docChgLst>
+    <pc:chgData name="Ebad Uddin" userId="538e1def2c29a779" providerId="LiveId" clId="{6B245639-E275-4B2C-ACBC-1BA91EAA5B1E}"/>
+    <pc:docChg chg="undo custSel modSld">
+      <pc:chgData name="Ebad Uddin" userId="538e1def2c29a779" providerId="LiveId" clId="{6B245639-E275-4B2C-ACBC-1BA91EAA5B1E}" dt="2023-05-08T07:26:42.947" v="221" actId="20577"/>
+      <pc:docMkLst>
+        <pc:docMk/>
+      </pc:docMkLst>
+      <pc:sldChg chg="modSp">
+        <pc:chgData name="Ebad Uddin" userId="538e1def2c29a779" providerId="LiveId" clId="{6B245639-E275-4B2C-ACBC-1BA91EAA5B1E}" dt="2023-05-08T07:11:39.762" v="25" actId="20577"/>
+        <pc:sldMkLst>
+          <pc:docMk/>
+          <pc:sldMk cId="1105188107" sldId="269"/>
+        </pc:sldMkLst>
+        <pc:spChg chg="mod">
+          <ac:chgData name="Ebad Uddin" userId="538e1def2c29a779" providerId="LiveId" clId="{6B245639-E275-4B2C-ACBC-1BA91EAA5B1E}" dt="2023-05-08T07:11:39.762" v="25" actId="20577"/>
+          <ac:spMkLst>
+            <pc:docMk/>
+            <pc:sldMk cId="1105188107" sldId="269"/>
+            <ac:spMk id="6" creationId="{B1CBA527-2B4B-4254-89A9-227E5D0AD16A}"/>
+          </ac:spMkLst>
+        </pc:spChg>
+      </pc:sldChg>
+      <pc:sldChg chg="modSp">
+        <pc:chgData name="Ebad Uddin" userId="538e1def2c29a779" providerId="LiveId" clId="{6B245639-E275-4B2C-ACBC-1BA91EAA5B1E}" dt="2023-05-08T07:16:32.565" v="58" actId="20577"/>
+        <pc:sldMkLst>
+          <pc:docMk/>
+          <pc:sldMk cId="3185258969" sldId="271"/>
+        </pc:sldMkLst>
+        <pc:spChg chg="mod">
+          <ac:chgData name="Ebad Uddin" userId="538e1def2c29a779" providerId="LiveId" clId="{6B245639-E275-4B2C-ACBC-1BA91EAA5B1E}" dt="2023-05-08T07:16:32.565" v="58" actId="20577"/>
+          <ac:spMkLst>
+            <pc:docMk/>
+            <pc:sldMk cId="3185258969" sldId="271"/>
+            <ac:spMk id="3" creationId="{51F31226-328F-4D5A-9872-5522E705FE40}"/>
+          </ac:spMkLst>
+        </pc:spChg>
+      </pc:sldChg>
+      <pc:sldChg chg="modSp">
+        <pc:chgData name="Ebad Uddin" userId="538e1def2c29a779" providerId="LiveId" clId="{6B245639-E275-4B2C-ACBC-1BA91EAA5B1E}" dt="2023-05-08T04:42:46.705" v="12" actId="20578"/>
+        <pc:sldMkLst>
+          <pc:docMk/>
+          <pc:sldMk cId="2852147052" sldId="274"/>
+        </pc:sldMkLst>
+        <pc:spChg chg="mod">
+          <ac:chgData name="Ebad Uddin" userId="538e1def2c29a779" providerId="LiveId" clId="{6B245639-E275-4B2C-ACBC-1BA91EAA5B1E}" dt="2023-05-08T04:42:46.705" v="12" actId="20578"/>
+          <ac:spMkLst>
+            <pc:docMk/>
+            <pc:sldMk cId="2852147052" sldId="274"/>
+            <ac:spMk id="3" creationId="{A9801ADD-DAC2-441B-82A7-04A30828DCBF}"/>
+          </ac:spMkLst>
+        </pc:spChg>
+      </pc:sldChg>
+      <pc:sldChg chg="modSp">
+        <pc:chgData name="Ebad Uddin" userId="538e1def2c29a779" providerId="LiveId" clId="{6B245639-E275-4B2C-ACBC-1BA91EAA5B1E}" dt="2023-05-06T06:22:57.520" v="11" actId="20577"/>
+        <pc:sldMkLst>
+          <pc:docMk/>
+          <pc:sldMk cId="3617424264" sldId="275"/>
+        </pc:sldMkLst>
+        <pc:spChg chg="mod">
+          <ac:chgData name="Ebad Uddin" userId="538e1def2c29a779" providerId="LiveId" clId="{6B245639-E275-4B2C-ACBC-1BA91EAA5B1E}" dt="2023-05-06T06:22:57.520" v="11" actId="20577"/>
+          <ac:spMkLst>
+            <pc:docMk/>
+            <pc:sldMk cId="3617424264" sldId="275"/>
+            <ac:spMk id="3" creationId="{5B32C070-B783-4E6B-A477-705AB06FF4F5}"/>
+          </ac:spMkLst>
+        </pc:spChg>
+      </pc:sldChg>
+      <pc:sldChg chg="modSp">
+        <pc:chgData name="Ebad Uddin" userId="538e1def2c29a779" providerId="LiveId" clId="{6B245639-E275-4B2C-ACBC-1BA91EAA5B1E}" dt="2023-05-08T07:18:38.952" v="100" actId="20577"/>
+        <pc:sldMkLst>
+          <pc:docMk/>
+          <pc:sldMk cId="3339655733" sldId="277"/>
+        </pc:sldMkLst>
+        <pc:spChg chg="mod">
+          <ac:chgData name="Ebad Uddin" userId="538e1def2c29a779" providerId="LiveId" clId="{6B245639-E275-4B2C-ACBC-1BA91EAA5B1E}" dt="2023-05-08T07:18:38.952" v="100" actId="20577"/>
+          <ac:spMkLst>
+            <pc:docMk/>
+            <pc:sldMk cId="3339655733" sldId="277"/>
+            <ac:spMk id="2" creationId="{CA4ED2AE-1E80-45AF-A1E7-CF78B90A3854}"/>
+          </ac:spMkLst>
+        </pc:spChg>
+      </pc:sldChg>
+      <pc:sldChg chg="modSp">
+        <pc:chgData name="Ebad Uddin" userId="538e1def2c29a779" providerId="LiveId" clId="{6B245639-E275-4B2C-ACBC-1BA91EAA5B1E}" dt="2023-05-08T07:26:42.947" v="221" actId="20577"/>
+        <pc:sldMkLst>
+          <pc:docMk/>
+          <pc:sldMk cId="130926494" sldId="278"/>
+        </pc:sldMkLst>
+        <pc:spChg chg="mod">
+          <ac:chgData name="Ebad Uddin" userId="538e1def2c29a779" providerId="LiveId" clId="{6B245639-E275-4B2C-ACBC-1BA91EAA5B1E}" dt="2023-05-08T07:26:42.947" v="221" actId="20577"/>
+          <ac:spMkLst>
+            <pc:docMk/>
+            <pc:sldMk cId="130926494" sldId="278"/>
+            <ac:spMk id="6" creationId="{8E21E9C9-A256-47BC-89AD-5B73E9E223D2}"/>
+          </ac:spMkLst>
+        </pc:spChg>
+      </pc:sldChg>
+    </pc:docChg>
+  </pc:docChgLst>
+  <pc:docChgLst>
     <pc:chgData name="Ebad Uddin" userId="538e1def2c29a779" providerId="LiveId" clId="{524A70CC-6FD1-442A-AB7C-DECC0A084651}"/>
     <pc:docChg chg="modSld">
       <pc:chgData name="Ebad Uddin" userId="538e1def2c29a779" providerId="LiveId" clId="{524A70CC-6FD1-442A-AB7C-DECC0A084651}" dt="2023-03-14T05:41:48.375" v="11"/>
@@ -310,7 +409,7 @@
           <a:p>
             <a:fld id="{E6AF8031-6397-42F4-8630-8424B573FB5A}" type="datetimeFigureOut">
               <a:rPr lang="en-US" smtClean="0"/>
-              <a:t>5/4/2023</a:t>
+              <a:t>5/8/2023</a:t>
             </a:fld>
             <a:endParaRPr lang="en-US"/>
           </a:p>
@@ -724,7 +823,7 @@
           <a:p>
             <a:fld id="{6278235F-8910-46B2-984A-1820EE168D9B}" type="datetime1">
               <a:rPr lang="en-US" smtClean="0"/>
-              <a:t>5/4/2023</a:t>
+              <a:t>5/8/2023</a:t>
             </a:fld>
             <a:endParaRPr lang="en-US"/>
           </a:p>
@@ -925,7 +1024,7 @@
           <a:p>
             <a:fld id="{CDC7B2F3-D2D8-4F5D-A88B-1BCC962570EF}" type="datetime1">
               <a:rPr lang="en-US" smtClean="0"/>
-              <a:t>5/4/2023</a:t>
+              <a:t>5/8/2023</a:t>
             </a:fld>
             <a:endParaRPr lang="en-US"/>
           </a:p>
@@ -1136,7 +1235,7 @@
           <a:p>
             <a:fld id="{EAAA300C-6241-4EBD-A79C-303C85ECA15A}" type="datetime1">
               <a:rPr lang="en-US" smtClean="0"/>
-              <a:t>5/4/2023</a:t>
+              <a:t>5/8/2023</a:t>
             </a:fld>
             <a:endParaRPr lang="en-US"/>
           </a:p>
@@ -1337,7 +1436,7 @@
           <a:p>
             <a:fld id="{8E206612-FAD9-441D-B9AD-D12127A2E59A}" type="datetime1">
               <a:rPr lang="en-US" smtClean="0"/>
-              <a:t>5/4/2023</a:t>
+              <a:t>5/8/2023</a:t>
             </a:fld>
             <a:endParaRPr lang="en-US"/>
           </a:p>
@@ -1615,7 +1714,7 @@
           <a:p>
             <a:fld id="{6CD710CA-9CCA-4D9B-9BD5-6BF974C36B77}" type="datetime1">
               <a:rPr lang="en-US" smtClean="0"/>
-              <a:t>5/4/2023</a:t>
+              <a:t>5/8/2023</a:t>
             </a:fld>
             <a:endParaRPr lang="en-US"/>
           </a:p>
@@ -1883,7 +1982,7 @@
           <a:p>
             <a:fld id="{37C5B303-EAED-4D9D-9649-A8359D8BECF6}" type="datetime1">
               <a:rPr lang="en-US" smtClean="0"/>
-              <a:t>5/4/2023</a:t>
+              <a:t>5/8/2023</a:t>
             </a:fld>
             <a:endParaRPr lang="en-US"/>
           </a:p>
@@ -2298,7 +2397,7 @@
           <a:p>
             <a:fld id="{141145D9-C107-4B78-9B2C-74B5CEF58614}" type="datetime1">
               <a:rPr lang="en-US" smtClean="0"/>
-              <a:t>5/4/2023</a:t>
+              <a:t>5/8/2023</a:t>
             </a:fld>
             <a:endParaRPr lang="en-US"/>
           </a:p>
@@ -2442,7 +2541,7 @@
           <a:p>
             <a:fld id="{91A0F3B1-92DC-4929-9B6E-1BD694511B81}" type="datetime1">
               <a:rPr lang="en-US" smtClean="0"/>
-              <a:t>5/4/2023</a:t>
+              <a:t>5/8/2023</a:t>
             </a:fld>
             <a:endParaRPr lang="en-US"/>
           </a:p>
@@ -2558,7 +2657,7 @@
           <a:p>
             <a:fld id="{2B7A4CE0-92B4-41A1-A9A4-CB3615C1794D}" type="datetime1">
               <a:rPr lang="en-US" smtClean="0"/>
-              <a:t>5/4/2023</a:t>
+              <a:t>5/8/2023</a:t>
             </a:fld>
             <a:endParaRPr lang="en-US"/>
           </a:p>
@@ -2872,7 +2971,7 @@
           <a:p>
             <a:fld id="{DB7DD55D-639B-459E-8EB9-A5A58BD5358F}" type="datetime1">
               <a:rPr lang="en-US" smtClean="0"/>
-              <a:t>5/4/2023</a:t>
+              <a:t>5/8/2023</a:t>
             </a:fld>
             <a:endParaRPr lang="en-US"/>
           </a:p>
@@ -3163,7 +3262,7 @@
           <a:p>
             <a:fld id="{8E8CD2C4-7848-4757-9E31-E85C8F89684D}" type="datetime1">
               <a:rPr lang="en-US" smtClean="0"/>
-              <a:t>5/4/2023</a:t>
+              <a:t>5/8/2023</a:t>
             </a:fld>
             <a:endParaRPr lang="en-US"/>
           </a:p>
@@ -3437,7 +3536,7 @@
           <a:p>
             <a:fld id="{893EFF75-B296-48A8-92AE-0899E85CD770}" type="datetime1">
               <a:rPr lang="en-US" smtClean="0"/>
-              <a:t>5/4/2023</a:t>
+              <a:t>5/8/2023</a:t>
             </a:fld>
             <a:endParaRPr lang="en-US"/>
           </a:p>
@@ -5052,7 +5151,7 @@
           <a:p>
             <a:r>
               <a:rPr lang="en-US" dirty="0"/>
-              <a:t>Avoid "-". If you name something "first-name", some software may think you want to subtract "name" from "first".</a:t>
+              <a:t>Avoid "-". If you name something "first-name", some software may think you want to subtract "name" from "first". </a:t>
             </a:r>
           </a:p>
           <a:p>
@@ -5714,7 +5813,7 @@
                     <a:p>
                       <a:pPr algn="l" fontAlgn="t"/>
                       <a:r>
-                        <a:rPr lang="en-US" sz="1700">
+                        <a:rPr lang="en-US" sz="1700" dirty="0">
                           <a:effectLst/>
                         </a:rPr>
                         <a:t>&lt;FIRSTNAME&gt;</a:t>
@@ -5889,10 +5988,22 @@
                     <a:p>
                       <a:pPr algn="l" fontAlgn="t"/>
                       <a:r>
-                        <a:rPr lang="en-US" sz="1700">
+                        <a:rPr lang="en-US" sz="1700" dirty="0">
                           <a:effectLst/>
                         </a:rPr>
-                        <a:t>&lt;first_name&gt;</a:t>
+                        <a:t>&lt;</a:t>
+                      </a:r>
+                      <a:r>
+                        <a:rPr lang="en-US" sz="1700" dirty="0" err="1">
+                          <a:effectLst/>
+                        </a:rPr>
+                        <a:t>first_name</a:t>
+                      </a:r>
+                      <a:r>
+                        <a:rPr lang="en-US" sz="1700" dirty="0">
+                          <a:effectLst/>
+                        </a:rPr>
+                        <a:t>&gt;</a:t>
                       </a:r>
                     </a:p>
                   </a:txBody>
@@ -6554,7 +6665,7 @@
             <a:r>
               <a:rPr lang="en-US" sz="2400" dirty="0">
                 <a:solidFill>
-                  <a:schemeClr val="accent6"/>
+                  <a:srgbClr val="FF0000"/>
                 </a:solidFill>
               </a:rPr>
               <a:t>&lt;gangster name='George "Shotgun" Ziegler'&gt;</a:t>
@@ -6685,8 +6796,23 @@
           <a:p>
             <a:r>
               <a:rPr lang="en-US" dirty="0"/>
-              <a:t>XML DTD:</a:t>
-            </a:r>
+              <a:t>XML DTD</a:t>
+            </a:r>
+            <a:r>
+              <a:rPr lang="en-US" dirty="0">
+                <a:sym typeface="Wingdings" panose="05000000000000000000" pitchFamily="2" charset="2"/>
+              </a:rPr>
+              <a:t> (w3C)</a:t>
+            </a:r>
+            <a:r>
+              <a:rPr lang="en-US" dirty="0"/>
+              <a:t> </a:t>
+            </a:r>
+            <a:r>
+              <a:rPr lang="en-US" dirty="0" err="1"/>
+              <a:t>worldWideWebConsortium</a:t>
+            </a:r>
+            <a:endParaRPr lang="en-US" dirty="0"/>
           </a:p>
         </p:txBody>
       </p:sp>
@@ -7068,7 +7194,7 @@
         <p:spPr>
           <a:xfrm>
             <a:off x="5818909" y="1548534"/>
-            <a:ext cx="6096000" cy="1200329"/>
+            <a:ext cx="6096000" cy="2862322"/>
           </a:xfrm>
           <a:prstGeom prst="rect">
             <a:avLst/>
@@ -7096,23 +7222,67 @@
                   <a:srgbClr val="FF0000"/>
                 </a:solidFill>
               </a:rPr>
-              <a:t>&lt;! DOCTYPE </a:t>
-            </a:r>
-            <a:r>
-              <a:rPr lang="en-US" dirty="0" err="1">
+              <a:t>&lt;! DOCTYPE note [</a:t>
+            </a:r>
+          </a:p>
+          <a:p>
+            <a:r>
+              <a:rPr lang="en-US" dirty="0">
                 <a:solidFill>
                   <a:srgbClr val="FF0000"/>
                 </a:solidFill>
               </a:rPr>
-              <a:t>rootElement</a:t>
-            </a:r>
+              <a:t>&lt;!ELEMENT note (to, from, heading, body)</a:t>
+            </a:r>
+          </a:p>
+          <a:p>
             <a:r>
               <a:rPr lang="en-US" dirty="0">
                 <a:solidFill>
                   <a:srgbClr val="FF0000"/>
                 </a:solidFill>
               </a:rPr>
-              <a:t> [DTD rules]&gt;</a:t>
+              <a:t>&lt;!ELEMENT to (#PCDATA)</a:t>
+            </a:r>
+          </a:p>
+          <a:p>
+            <a:r>
+              <a:rPr lang="en-US" dirty="0">
+                <a:solidFill>
+                  <a:srgbClr val="FF0000"/>
+                </a:solidFill>
+              </a:rPr>
+              <a:t>&lt;!ELEMENT from (#PCDATA)</a:t>
+            </a:r>
+          </a:p>
+          <a:p>
+            <a:r>
+              <a:rPr lang="en-US" dirty="0">
+                <a:solidFill>
+                  <a:srgbClr val="FF0000"/>
+                </a:solidFill>
+              </a:rPr>
+              <a:t>&lt;!ELEMENT heading (#PCDATA)</a:t>
+            </a:r>
+          </a:p>
+          <a:p>
+            <a:r>
+              <a:rPr lang="en-US" dirty="0">
+                <a:solidFill>
+                  <a:srgbClr val="FF0000"/>
+                </a:solidFill>
+              </a:rPr>
+              <a:t>&lt;!ELEMENT body (#PCDATA)</a:t>
+            </a:r>
+          </a:p>
+          <a:p>
+            <a:r>
+              <a:rPr lang="en-US" dirty="0">
+                <a:solidFill>
+                  <a:srgbClr val="FF0000"/>
+                </a:solidFill>
+              </a:rPr>
+              <a:t>]&gt;</a:t>
             </a:r>
           </a:p>
           <a:p>
@@ -9505,7 +9675,7 @@
                 </a:solidFill>
                 <a:latin typeface="Consolas" panose="020B0609020204030204" pitchFamily="49" charset="0"/>
               </a:rPr>
-              <a:t>="http://www.w3.org/TR/html4/"&gt;</a:t>
+              <a:t>="http://www.w3.org/html4/"&gt;</a:t>
             </a:r>
             <a:br>
               <a:rPr lang="en-US" sz="2300" dirty="0">
@@ -9777,7 +9947,7 @@
                 </a:solidFill>
                 <a:latin typeface="Consolas" panose="020B0609020204030204" pitchFamily="49" charset="0"/>
               </a:rPr>
-              <a:t>="https://www.w3schools.com/furniture"&gt;</a:t>
+              <a:t>="https://www.w4.com/furniture"&gt;</a:t>
             </a:r>
             <a:br>
               <a:rPr lang="en-US" sz="2300" dirty="0">

</xml_diff>